<commit_message>
Add `patch_autofit.py` script and update German presentation slides
- Introduced `patch_autofit.py` to enforce AutoFit in PPTX files for consistent text fitting.
- Updated presentation slides with added prompts, examples, and layout enhancements.
- Included new presentation assets with improved visual consistency and content clarity.
</commit_message>
<xml_diff>
--- a/doc/ai/presentation/template.pptx
+++ b/doc/ai/presentation/template.pptx
@@ -202,7 +202,7 @@
           <a:p>
             <a:fld id="{8993A166-1F31-487E-8A46-D11B4D0E59FD}" type="datetimeFigureOut">
               <a:rPr lang="de-DE" smtClean="0"/>
-              <a:t>13.01.2026</a:t>
+              <a:t>14.01.2026</a:t>
             </a:fld>
             <a:endParaRPr lang="de-DE"/>
           </a:p>
@@ -1561,7 +1561,7 @@
           </a:blip>
           <a:srcRect/>
           <a:stretch>
-            <a:fillRect/>
+            <a:fillRect t="-9000" b="-9000"/>
           </a:stretch>
         </a:blipFill>
         <a:effectLst/>
@@ -1599,15 +1599,19 @@
         </p:nvSpPr>
         <p:spPr>
           <a:xfrm>
-            <a:off x="1524000" y="1122363"/>
-            <a:ext cx="9144000" cy="2387600"/>
+            <a:off x="1524000" y="581062"/>
+            <a:ext cx="9144000" cy="772953"/>
           </a:xfrm>
         </p:spPr>
         <p:txBody>
           <a:bodyPr anchor="b"/>
           <a:lstStyle>
             <a:lvl1pPr algn="ctr">
-              <a:defRPr sz="6000"/>
+              <a:defRPr sz="6000">
+                <a:solidFill>
+                  <a:schemeClr val="bg1"/>
+                </a:solidFill>
+              </a:defRPr>
             </a:lvl1pPr>
           </a:lstStyle>
           <a:p>
@@ -1615,10 +1619,10 @@
               <a:defRPr sz="2200"/>
             </a:pPr>
             <a:r>
-              <a:rPr lang="en-US"/>
+              <a:rPr lang="en-US" dirty="0"/>
               <a:t>Click to edit Master title style</a:t>
             </a:r>
-            <a:endParaRPr lang="de-CH"/>
+            <a:endParaRPr lang="de-CH" dirty="0"/>
           </a:p>
         </p:txBody>
       </p:sp>
@@ -1640,8 +1644,8 @@
         </p:nvSpPr>
         <p:spPr>
           <a:xfrm>
-            <a:off x="1524000" y="3602038"/>
-            <a:ext cx="9144000" cy="1655762"/>
+            <a:off x="1524000" y="1501367"/>
+            <a:ext cx="9144000" cy="772953"/>
           </a:xfrm>
         </p:spPr>
         <p:txBody>
@@ -1649,7 +1653,11 @@
           <a:lstStyle>
             <a:lvl1pPr marL="0" indent="0" algn="ctr">
               <a:buNone/>
-              <a:defRPr sz="2400"/>
+              <a:defRPr sz="2400">
+                <a:solidFill>
+                  <a:schemeClr val="bg1"/>
+                </a:solidFill>
+              </a:defRPr>
             </a:lvl1pPr>
             <a:lvl2pPr marL="457200" indent="0" algn="ctr">
               <a:buNone/>
@@ -1689,10 +1697,10 @@
               <a:defRPr sz="2200"/>
             </a:pPr>
             <a:r>
-              <a:rPr lang="en-US"/>
+              <a:rPr lang="en-US" dirty="0"/>
               <a:t>Click to edit Master subtitle style</a:t>
             </a:r>
-            <a:endParaRPr lang="de-CH"/>
+            <a:endParaRPr lang="de-CH" dirty="0"/>
           </a:p>
         </p:txBody>
       </p:sp>
@@ -1715,16 +1723,27 @@
         <p:spPr/>
         <p:txBody>
           <a:bodyPr/>
-          <a:lstStyle/>
+          <a:lstStyle>
+            <a:lvl1pPr>
+              <a:defRPr>
+                <a:solidFill>
+                  <a:schemeClr val="bg1"/>
+                </a:solidFill>
+              </a:defRPr>
+            </a:lvl1pPr>
+          </a:lstStyle>
           <a:p>
             <a:pPr>
               <a:defRPr sz="2200"/>
             </a:pPr>
             <a:fld id="{0CDDCF47-76FA-4B38-9020-A0E57F41036A}" type="datetimeFigureOut">
-              <a:rPr lang="de-CH" smtClean="0"/>
-              <a:t>13.01.2026</a:t>
+              <a:rPr lang="de-CH" sz="2200" smtClean="0"/>
+              <a:pPr>
+                <a:defRPr sz="2200"/>
+              </a:pPr>
+              <a:t>14.01.2026</a:t>
             </a:fld>
-            <a:endParaRPr lang="de-CH"/>
+            <a:endParaRPr lang="de-CH" sz="2200" dirty="0"/>
           </a:p>
         </p:txBody>
       </p:sp>
@@ -1944,7 +1963,7 @@
             </a:pPr>
             <a:fld id="{0CDDCF47-76FA-4B38-9020-A0E57F41036A}" type="datetimeFigureOut">
               <a:rPr lang="de-CH" smtClean="0"/>
-              <a:t>13.01.2026</a:t>
+              <a:t>14.01.2026</a:t>
             </a:fld>
             <a:endParaRPr lang="de-CH"/>
           </a:p>
@@ -2176,7 +2195,7 @@
             </a:pPr>
             <a:fld id="{0CDDCF47-76FA-4B38-9020-A0E57F41036A}" type="datetimeFigureOut">
               <a:rPr lang="de-CH" smtClean="0"/>
-              <a:t>13.01.2026</a:t>
+              <a:t>14.01.2026</a:t>
             </a:fld>
             <a:endParaRPr lang="de-CH"/>
           </a:p>
@@ -4461,7 +4480,7 @@
             </a:pPr>
             <a:fld id="{0CDDCF47-76FA-4B38-9020-A0E57F41036A}" type="datetimeFigureOut">
               <a:rPr lang="de-CH" smtClean="0"/>
-              <a:t>13.01.2026</a:t>
+              <a:t>14.01.2026</a:t>
             </a:fld>
             <a:endParaRPr lang="de-CH"/>
           </a:p>
@@ -4751,7 +4770,7 @@
             </a:pPr>
             <a:fld id="{0CDDCF47-76FA-4B38-9020-A0E57F41036A}" type="datetimeFigureOut">
               <a:rPr lang="de-CH" smtClean="0"/>
-              <a:t>13.01.2026</a:t>
+              <a:t>14.01.2026</a:t>
             </a:fld>
             <a:endParaRPr lang="de-CH"/>
           </a:p>
@@ -5051,7 +5070,7 @@
             </a:pPr>
             <a:fld id="{0CDDCF47-76FA-4B38-9020-A0E57F41036A}" type="datetimeFigureOut">
               <a:rPr lang="de-CH" smtClean="0"/>
-              <a:t>13.01.2026</a:t>
+              <a:t>14.01.2026</a:t>
             </a:fld>
             <a:endParaRPr lang="de-CH"/>
           </a:p>
@@ -5502,7 +5521,7 @@
             </a:pPr>
             <a:fld id="{0CDDCF47-76FA-4B38-9020-A0E57F41036A}" type="datetimeFigureOut">
               <a:rPr lang="de-CH" smtClean="0"/>
-              <a:t>13.01.2026</a:t>
+              <a:t>14.01.2026</a:t>
             </a:fld>
             <a:endParaRPr lang="de-CH"/>
           </a:p>
@@ -5656,7 +5675,7 @@
             </a:pPr>
             <a:fld id="{0CDDCF47-76FA-4B38-9020-A0E57F41036A}" type="datetimeFigureOut">
               <a:rPr lang="de-CH" smtClean="0"/>
-              <a:t>13.01.2026</a:t>
+              <a:t>14.01.2026</a:t>
             </a:fld>
             <a:endParaRPr lang="de-CH"/>
           </a:p>
@@ -5778,7 +5797,7 @@
             </a:pPr>
             <a:fld id="{0CDDCF47-76FA-4B38-9020-A0E57F41036A}" type="datetimeFigureOut">
               <a:rPr lang="de-CH" smtClean="0"/>
-              <a:t>13.01.2026</a:t>
+              <a:t>14.01.2026</a:t>
             </a:fld>
             <a:endParaRPr lang="de-CH"/>
           </a:p>
@@ -6115,7 +6134,7 @@
             </a:pPr>
             <a:fld id="{0CDDCF47-76FA-4B38-9020-A0E57F41036A}" type="datetimeFigureOut">
               <a:rPr lang="de-CH" smtClean="0"/>
-              <a:t>13.01.2026</a:t>
+              <a:t>14.01.2026</a:t>
             </a:fld>
             <a:endParaRPr lang="de-CH"/>
           </a:p>
@@ -6421,7 +6440,7 @@
             </a:pPr>
             <a:fld id="{0CDDCF47-76FA-4B38-9020-A0E57F41036A}" type="datetimeFigureOut">
               <a:rPr lang="de-CH" smtClean="0"/>
-              <a:t>13.01.2026</a:t>
+              <a:t>14.01.2026</a:t>
             </a:fld>
             <a:endParaRPr lang="de-CH"/>
           </a:p>
@@ -6670,7 +6689,7 @@
           <a:p>
             <a:fld id="{0CDDCF47-76FA-4B38-9020-A0E57F41036A}" type="datetimeFigureOut">
               <a:rPr lang="de-CH" smtClean="0"/>
-              <a:t>13.01.2026</a:t>
+              <a:t>14.01.2026</a:t>
             </a:fld>
             <a:endParaRPr lang="de-CH"/>
           </a:p>

</xml_diff>